<commit_message>
This version has colours as indicators rather than entire background.
</commit_message>
<xml_diff>
--- a/Future of Clothing, a progress slide.pptx
+++ b/Future of Clothing, a progress slide.pptx
@@ -819,7 +819,7 @@
   <p:cSld>
     <p:spTree>
       <p:nvGrpSpPr>
-        <p:cNvPr id="208" name="Shape 208"/>
+        <p:cNvPr id="214" name="Shape 214"/>
         <p:cNvGrpSpPr/>
         <p:nvPr/>
       </p:nvGrpSpPr>
@@ -833,7 +833,7 @@
       </p:grpSpPr>
       <p:sp>
         <p:nvSpPr>
-          <p:cNvPr id="209" name="Google Shape;209;g81252fc35d_0_17:notes"/>
+          <p:cNvPr id="215" name="Google Shape;215;g81252fc35d_0_17:notes"/>
           <p:cNvSpPr/>
           <p:nvPr>
             <p:ph idx="2" type="sldImg"/>
@@ -868,7 +868,7 @@
       </p:sp>
       <p:sp>
         <p:nvSpPr>
-          <p:cNvPr id="210" name="Google Shape;210;g81252fc35d_0_17:notes"/>
+          <p:cNvPr id="216" name="Google Shape;216;g81252fc35d_0_17:notes"/>
           <p:cNvSpPr txBox="1"/>
           <p:nvPr>
             <p:ph idx="1" type="body"/>
@@ -918,7 +918,7 @@
   <p:cSld>
     <p:spTree>
       <p:nvGrpSpPr>
-        <p:cNvPr id="217" name="Shape 217"/>
+        <p:cNvPr id="225" name="Shape 225"/>
         <p:cNvGrpSpPr/>
         <p:nvPr/>
       </p:nvGrpSpPr>
@@ -932,7 +932,7 @@
       </p:grpSpPr>
       <p:sp>
         <p:nvSpPr>
-          <p:cNvPr id="218" name="Google Shape;218;g81252fc35d_0_25:notes"/>
+          <p:cNvPr id="226" name="Google Shape;226;g81252fc35d_0_25:notes"/>
           <p:cNvSpPr/>
           <p:nvPr>
             <p:ph idx="2" type="sldImg"/>
@@ -967,7 +967,7 @@
       </p:sp>
       <p:sp>
         <p:nvSpPr>
-          <p:cNvPr id="219" name="Google Shape;219;g81252fc35d_0_25:notes"/>
+          <p:cNvPr id="227" name="Google Shape;227;g81252fc35d_0_25:notes"/>
           <p:cNvSpPr txBox="1"/>
           <p:nvPr>
             <p:ph idx="1" type="body"/>
@@ -1017,7 +1017,7 @@
   <p:cSld>
     <p:spTree>
       <p:nvGrpSpPr>
-        <p:cNvPr id="227" name="Shape 227"/>
+        <p:cNvPr id="237" name="Shape 237"/>
         <p:cNvGrpSpPr/>
         <p:nvPr/>
       </p:nvGrpSpPr>
@@ -1031,7 +1031,7 @@
       </p:grpSpPr>
       <p:sp>
         <p:nvSpPr>
-          <p:cNvPr id="228" name="Google Shape;228;g810d626661_0_254:notes"/>
+          <p:cNvPr id="238" name="Google Shape;238;g810d626661_0_254:notes"/>
           <p:cNvSpPr/>
           <p:nvPr>
             <p:ph idx="2" type="sldImg"/>
@@ -1066,7 +1066,7 @@
       </p:sp>
       <p:sp>
         <p:nvSpPr>
-          <p:cNvPr id="229" name="Google Shape;229;g810d626661_0_254:notes"/>
+          <p:cNvPr id="239" name="Google Shape;239;g810d626661_0_254:notes"/>
           <p:cNvSpPr txBox="1"/>
           <p:nvPr>
             <p:ph idx="1" type="body"/>
@@ -1116,7 +1116,7 @@
   <p:cSld>
     <p:spTree>
       <p:nvGrpSpPr>
-        <p:cNvPr id="233" name="Shape 233"/>
+        <p:cNvPr id="245" name="Shape 245"/>
         <p:cNvGrpSpPr/>
         <p:nvPr/>
       </p:nvGrpSpPr>
@@ -1130,7 +1130,7 @@
       </p:grpSpPr>
       <p:sp>
         <p:nvSpPr>
-          <p:cNvPr id="234" name="Google Shape;234;g810d626661_0_259:notes"/>
+          <p:cNvPr id="246" name="Google Shape;246;g810d626661_0_259:notes"/>
           <p:cNvSpPr/>
           <p:nvPr>
             <p:ph idx="2" type="sldImg"/>
@@ -1165,7 +1165,7 @@
       </p:sp>
       <p:sp>
         <p:nvSpPr>
-          <p:cNvPr id="235" name="Google Shape;235;g810d626661_0_259:notes"/>
+          <p:cNvPr id="247" name="Google Shape;247;g810d626661_0_259:notes"/>
           <p:cNvSpPr txBox="1"/>
           <p:nvPr>
             <p:ph idx="1" type="body"/>
@@ -1215,7 +1215,7 @@
   <p:cSld>
     <p:spTree>
       <p:nvGrpSpPr>
-        <p:cNvPr id="242" name="Shape 242"/>
+        <p:cNvPr id="256" name="Shape 256"/>
         <p:cNvGrpSpPr/>
         <p:nvPr/>
       </p:nvGrpSpPr>
@@ -1229,7 +1229,7 @@
       </p:grpSpPr>
       <p:sp>
         <p:nvSpPr>
-          <p:cNvPr id="243" name="Google Shape;243;g810d626661_5_0:notes"/>
+          <p:cNvPr id="257" name="Google Shape;257;g810d626661_5_0:notes"/>
           <p:cNvSpPr/>
           <p:nvPr>
             <p:ph idx="2" type="sldImg"/>
@@ -1264,7 +1264,7 @@
       </p:sp>
       <p:sp>
         <p:nvSpPr>
-          <p:cNvPr id="244" name="Google Shape;244;g810d626661_5_0:notes"/>
+          <p:cNvPr id="258" name="Google Shape;258;g810d626661_5_0:notes"/>
           <p:cNvSpPr txBox="1"/>
           <p:nvPr>
             <p:ph idx="1" type="body"/>
@@ -1314,7 +1314,7 @@
   <p:cSld>
     <p:spTree>
       <p:nvGrpSpPr>
-        <p:cNvPr id="250" name="Shape 250"/>
+        <p:cNvPr id="266" name="Shape 266"/>
         <p:cNvGrpSpPr/>
         <p:nvPr/>
       </p:nvGrpSpPr>
@@ -1328,7 +1328,7 @@
       </p:grpSpPr>
       <p:sp>
         <p:nvSpPr>
-          <p:cNvPr id="251" name="Google Shape;251;g810d626661_3_0:notes"/>
+          <p:cNvPr id="267" name="Google Shape;267;g810d626661_3_0:notes"/>
           <p:cNvSpPr/>
           <p:nvPr>
             <p:ph idx="2" type="sldImg"/>
@@ -1363,7 +1363,7 @@
       </p:sp>
       <p:sp>
         <p:nvSpPr>
-          <p:cNvPr id="252" name="Google Shape;252;g810d626661_3_0:notes"/>
+          <p:cNvPr id="268" name="Google Shape;268;g810d626661_3_0:notes"/>
           <p:cNvSpPr txBox="1"/>
           <p:nvPr>
             <p:ph idx="1" type="body"/>
@@ -1413,7 +1413,7 @@
   <p:cSld>
     <p:spTree>
       <p:nvGrpSpPr>
-        <p:cNvPr id="256" name="Shape 256"/>
+        <p:cNvPr id="274" name="Shape 274"/>
         <p:cNvGrpSpPr/>
         <p:nvPr/>
       </p:nvGrpSpPr>
@@ -1427,7 +1427,7 @@
       </p:grpSpPr>
       <p:sp>
         <p:nvSpPr>
-          <p:cNvPr id="257" name="Google Shape;257;g810d626661_3_32:notes"/>
+          <p:cNvPr id="275" name="Google Shape;275;g810d626661_3_32:notes"/>
           <p:cNvSpPr/>
           <p:nvPr>
             <p:ph idx="2" type="sldImg"/>
@@ -1462,7 +1462,7 @@
       </p:sp>
       <p:sp>
         <p:nvSpPr>
-          <p:cNvPr id="258" name="Google Shape;258;g810d626661_3_32:notes"/>
+          <p:cNvPr id="276" name="Google Shape;276;g810d626661_3_32:notes"/>
           <p:cNvSpPr txBox="1"/>
           <p:nvPr>
             <p:ph idx="1" type="body"/>
@@ -2106,7 +2106,7 @@
   <p:cSld>
     <p:spTree>
       <p:nvGrpSpPr>
-        <p:cNvPr id="194" name="Shape 194"/>
+        <p:cNvPr id="196" name="Shape 196"/>
         <p:cNvGrpSpPr/>
         <p:nvPr/>
       </p:nvGrpSpPr>
@@ -2120,7 +2120,7 @@
       </p:grpSpPr>
       <p:sp>
         <p:nvSpPr>
-          <p:cNvPr id="195" name="Google Shape;195;g81252fc35d_0_5:notes"/>
+          <p:cNvPr id="197" name="Google Shape;197;g81252fc35d_0_5:notes"/>
           <p:cNvSpPr/>
           <p:nvPr>
             <p:ph idx="2" type="sldImg"/>
@@ -2155,7 +2155,7 @@
       </p:sp>
       <p:sp>
         <p:nvSpPr>
-          <p:cNvPr id="196" name="Google Shape;196;g81252fc35d_0_5:notes"/>
+          <p:cNvPr id="198" name="Google Shape;198;g81252fc35d_0_5:notes"/>
           <p:cNvSpPr txBox="1"/>
           <p:nvPr>
             <p:ph idx="1" type="body"/>
@@ -2205,7 +2205,7 @@
   <p:cSld>
     <p:spTree>
       <p:nvGrpSpPr>
-        <p:cNvPr id="202" name="Shape 202"/>
+        <p:cNvPr id="206" name="Shape 206"/>
         <p:cNvGrpSpPr/>
         <p:nvPr/>
       </p:nvGrpSpPr>
@@ -2219,7 +2219,7 @@
       </p:grpSpPr>
       <p:sp>
         <p:nvSpPr>
-          <p:cNvPr id="203" name="Google Shape;203;g81252fc35d_0_12:notes"/>
+          <p:cNvPr id="207" name="Google Shape;207;g81252fc35d_0_12:notes"/>
           <p:cNvSpPr/>
           <p:nvPr>
             <p:ph idx="2" type="sldImg"/>
@@ -2254,7 +2254,7 @@
       </p:sp>
       <p:sp>
         <p:nvSpPr>
-          <p:cNvPr id="204" name="Google Shape;204;g81252fc35d_0_12:notes"/>
+          <p:cNvPr id="208" name="Google Shape;208;g81252fc35d_0_12:notes"/>
           <p:cNvSpPr txBox="1"/>
           <p:nvPr>
             <p:ph idx="1" type="body"/>
@@ -17871,13 +17871,13 @@
     <p:bg>
       <p:bgPr>
         <a:solidFill>
-          <a:srgbClr val="D9D9D9"/>
+          <a:srgbClr val="FFFFFF"/>
         </a:solidFill>
       </p:bgPr>
     </p:bg>
     <p:spTree>
       <p:nvGrpSpPr>
-        <p:cNvPr id="211" name="Shape 211"/>
+        <p:cNvPr id="217" name="Shape 217"/>
         <p:cNvGrpSpPr/>
         <p:nvPr/>
       </p:nvGrpSpPr>
@@ -17891,7 +17891,7 @@
       </p:grpSpPr>
       <p:sp>
         <p:nvSpPr>
-          <p:cNvPr id="212" name="Google Shape;212;p34"/>
+          <p:cNvPr id="218" name="Google Shape;218;p34"/>
           <p:cNvSpPr txBox="1"/>
           <p:nvPr>
             <p:ph type="title"/>
@@ -17924,14 +17924,14 @@
             <a:r>
               <a:rPr lang="en" sz="2900">
                 <a:solidFill>
-                  <a:srgbClr val="000000"/>
+                  <a:srgbClr val="999999"/>
                 </a:solidFill>
               </a:rPr>
               <a:t>Sample of extracted point-cloud and mesh</a:t>
             </a:r>
             <a:endParaRPr sz="2900">
               <a:solidFill>
-                <a:srgbClr val="000000"/>
+                <a:srgbClr val="999999"/>
               </a:solidFill>
             </a:endParaRPr>
           </a:p>
@@ -17939,7 +17939,7 @@
       </p:sp>
       <p:pic>
         <p:nvPicPr>
-          <p:cNvPr id="213" name="Google Shape;213;p34"/>
+          <p:cNvPr id="219" name="Google Shape;219;p34"/>
           <p:cNvPicPr preferRelativeResize="0"/>
           <p:nvPr/>
         </p:nvPicPr>
@@ -17967,7 +17967,7 @@
       </p:pic>
       <p:pic>
         <p:nvPicPr>
-          <p:cNvPr id="214" name="Google Shape;214;p34"/>
+          <p:cNvPr id="220" name="Google Shape;220;p34"/>
           <p:cNvPicPr preferRelativeResize="0"/>
           <p:nvPr/>
         </p:nvPicPr>
@@ -17995,7 +17995,7 @@
       </p:pic>
       <p:sp>
         <p:nvSpPr>
-          <p:cNvPr id="215" name="Google Shape;215;p34"/>
+          <p:cNvPr id="221" name="Google Shape;221;p34"/>
           <p:cNvSpPr txBox="1"/>
           <p:nvPr/>
         </p:nvSpPr>
@@ -18047,7 +18047,7 @@
       </p:sp>
       <p:sp>
         <p:nvSpPr>
-          <p:cNvPr id="216" name="Google Shape;216;p34"/>
+          <p:cNvPr id="222" name="Google Shape;222;p34"/>
           <p:cNvSpPr txBox="1"/>
           <p:nvPr/>
         </p:nvSpPr>
@@ -18097,6 +18097,92 @@
           </a:p>
         </p:txBody>
       </p:sp>
+      <p:sp>
+        <p:nvSpPr>
+          <p:cNvPr id="223" name="Google Shape;223;p34"/>
+          <p:cNvSpPr/>
+          <p:nvPr/>
+        </p:nvSpPr>
+        <p:spPr>
+          <a:xfrm>
+            <a:off x="8826675" y="-14850"/>
+            <a:ext cx="317400" cy="5143500"/>
+          </a:xfrm>
+          <a:prstGeom prst="rect">
+            <a:avLst/>
+          </a:prstGeom>
+          <a:solidFill>
+            <a:srgbClr val="999999"/>
+          </a:solidFill>
+          <a:ln>
+            <a:noFill/>
+          </a:ln>
+        </p:spPr>
+        <p:txBody>
+          <a:bodyPr anchorCtr="0" anchor="ctr" bIns="91425" lIns="91425" spcFirstLastPara="1" rIns="91425" wrap="square" tIns="91425">
+            <a:noAutofit/>
+          </a:bodyPr>
+          <a:lstStyle/>
+          <a:p>
+            <a:pPr indent="0" lvl="0" marL="0" rtl="0" algn="l">
+              <a:spcBef>
+                <a:spcPts val="0"/>
+              </a:spcBef>
+              <a:spcAft>
+                <a:spcPts val="0"/>
+              </a:spcAft>
+              <a:buNone/>
+            </a:pPr>
+            <a:r>
+              <a:t/>
+            </a:r>
+            <a:endParaRPr/>
+          </a:p>
+        </p:txBody>
+      </p:sp>
+      <p:sp>
+        <p:nvSpPr>
+          <p:cNvPr id="224" name="Google Shape;224;p34"/>
+          <p:cNvSpPr/>
+          <p:nvPr/>
+        </p:nvSpPr>
+        <p:spPr>
+          <a:xfrm>
+            <a:off x="0" y="-14850"/>
+            <a:ext cx="317400" cy="5143500"/>
+          </a:xfrm>
+          <a:prstGeom prst="rect">
+            <a:avLst/>
+          </a:prstGeom>
+          <a:solidFill>
+            <a:srgbClr val="999999"/>
+          </a:solidFill>
+          <a:ln>
+            <a:noFill/>
+          </a:ln>
+        </p:spPr>
+        <p:txBody>
+          <a:bodyPr anchorCtr="0" anchor="ctr" bIns="91425" lIns="91425" spcFirstLastPara="1" rIns="91425" wrap="square" tIns="91425">
+            <a:noAutofit/>
+          </a:bodyPr>
+          <a:lstStyle/>
+          <a:p>
+            <a:pPr indent="0" lvl="0" marL="0" rtl="0" algn="l">
+              <a:spcBef>
+                <a:spcPts val="0"/>
+              </a:spcBef>
+              <a:spcAft>
+                <a:spcPts val="0"/>
+              </a:spcAft>
+              <a:buNone/>
+            </a:pPr>
+            <a:r>
+              <a:t/>
+            </a:r>
+            <a:endParaRPr/>
+          </a:p>
+        </p:txBody>
+      </p:sp>
     </p:spTree>
   </p:cSld>
   <p:clrMapOvr>
@@ -18111,13 +18197,13 @@
     <p:bg>
       <p:bgPr>
         <a:solidFill>
-          <a:srgbClr val="D9D9D9"/>
+          <a:srgbClr val="FFFFFF"/>
         </a:solidFill>
       </p:bgPr>
     </p:bg>
     <p:spTree>
       <p:nvGrpSpPr>
-        <p:cNvPr id="220" name="Shape 220"/>
+        <p:cNvPr id="228" name="Shape 228"/>
         <p:cNvGrpSpPr/>
         <p:nvPr/>
       </p:nvGrpSpPr>
@@ -18131,7 +18217,7 @@
       </p:grpSpPr>
       <p:sp>
         <p:nvSpPr>
-          <p:cNvPr id="221" name="Google Shape;221;p35"/>
+          <p:cNvPr id="229" name="Google Shape;229;p35"/>
           <p:cNvSpPr txBox="1"/>
           <p:nvPr>
             <p:ph type="title"/>
@@ -18164,14 +18250,14 @@
             <a:r>
               <a:rPr lang="en">
                 <a:solidFill>
-                  <a:srgbClr val="000000"/>
+                  <a:srgbClr val="999999"/>
                 </a:solidFill>
               </a:rPr>
               <a:t>.mat Data to Surface Mesh</a:t>
             </a:r>
             <a:endParaRPr>
               <a:solidFill>
-                <a:srgbClr val="000000"/>
+                <a:srgbClr val="999999"/>
               </a:solidFill>
             </a:endParaRPr>
           </a:p>
@@ -18179,7 +18265,7 @@
       </p:sp>
       <p:sp>
         <p:nvSpPr>
-          <p:cNvPr id="222" name="Google Shape;222;p35"/>
+          <p:cNvPr id="230" name="Google Shape;230;p35"/>
           <p:cNvSpPr/>
           <p:nvPr/>
         </p:nvSpPr>
@@ -18247,7 +18333,7 @@
       </p:sp>
       <p:sp>
         <p:nvSpPr>
-          <p:cNvPr id="223" name="Google Shape;223;p35"/>
+          <p:cNvPr id="231" name="Google Shape;231;p35"/>
           <p:cNvSpPr/>
           <p:nvPr/>
         </p:nvSpPr>
@@ -18299,7 +18385,7 @@
       </p:sp>
       <p:sp>
         <p:nvSpPr>
-          <p:cNvPr id="224" name="Google Shape;224;p35"/>
+          <p:cNvPr id="232" name="Google Shape;232;p35"/>
           <p:cNvSpPr/>
           <p:nvPr/>
         </p:nvSpPr>
@@ -18351,7 +18437,7 @@
       </p:sp>
       <p:sp>
         <p:nvSpPr>
-          <p:cNvPr id="225" name="Google Shape;225;p35"/>
+          <p:cNvPr id="233" name="Google Shape;233;p35"/>
           <p:cNvSpPr/>
           <p:nvPr/>
         </p:nvSpPr>
@@ -18403,7 +18489,7 @@
       </p:sp>
       <p:sp>
         <p:nvSpPr>
-          <p:cNvPr id="226" name="Google Shape;226;p35"/>
+          <p:cNvPr id="234" name="Google Shape;234;p35"/>
           <p:cNvSpPr/>
           <p:nvPr/>
         </p:nvSpPr>
@@ -18457,6 +18543,92 @@
           </a:p>
         </p:txBody>
       </p:sp>
+      <p:sp>
+        <p:nvSpPr>
+          <p:cNvPr id="235" name="Google Shape;235;p35"/>
+          <p:cNvSpPr/>
+          <p:nvPr/>
+        </p:nvSpPr>
+        <p:spPr>
+          <a:xfrm>
+            <a:off x="8826675" y="-14850"/>
+            <a:ext cx="317400" cy="5143500"/>
+          </a:xfrm>
+          <a:prstGeom prst="rect">
+            <a:avLst/>
+          </a:prstGeom>
+          <a:solidFill>
+            <a:srgbClr val="999999"/>
+          </a:solidFill>
+          <a:ln>
+            <a:noFill/>
+          </a:ln>
+        </p:spPr>
+        <p:txBody>
+          <a:bodyPr anchorCtr="0" anchor="ctr" bIns="91425" lIns="91425" spcFirstLastPara="1" rIns="91425" wrap="square" tIns="91425">
+            <a:noAutofit/>
+          </a:bodyPr>
+          <a:lstStyle/>
+          <a:p>
+            <a:pPr indent="0" lvl="0" marL="0" rtl="0" algn="l">
+              <a:spcBef>
+                <a:spcPts val="0"/>
+              </a:spcBef>
+              <a:spcAft>
+                <a:spcPts val="0"/>
+              </a:spcAft>
+              <a:buNone/>
+            </a:pPr>
+            <a:r>
+              <a:t/>
+            </a:r>
+            <a:endParaRPr/>
+          </a:p>
+        </p:txBody>
+      </p:sp>
+      <p:sp>
+        <p:nvSpPr>
+          <p:cNvPr id="236" name="Google Shape;236;p35"/>
+          <p:cNvSpPr/>
+          <p:nvPr/>
+        </p:nvSpPr>
+        <p:spPr>
+          <a:xfrm>
+            <a:off x="0" y="-14850"/>
+            <a:ext cx="317400" cy="5143500"/>
+          </a:xfrm>
+          <a:prstGeom prst="rect">
+            <a:avLst/>
+          </a:prstGeom>
+          <a:solidFill>
+            <a:srgbClr val="999999"/>
+          </a:solidFill>
+          <a:ln>
+            <a:noFill/>
+          </a:ln>
+        </p:spPr>
+        <p:txBody>
+          <a:bodyPr anchorCtr="0" anchor="ctr" bIns="91425" lIns="91425" spcFirstLastPara="1" rIns="91425" wrap="square" tIns="91425">
+            <a:noAutofit/>
+          </a:bodyPr>
+          <a:lstStyle/>
+          <a:p>
+            <a:pPr indent="0" lvl="0" marL="0" rtl="0" algn="l">
+              <a:spcBef>
+                <a:spcPts val="0"/>
+              </a:spcBef>
+              <a:spcAft>
+                <a:spcPts val="0"/>
+              </a:spcAft>
+              <a:buNone/>
+            </a:pPr>
+            <a:r>
+              <a:t/>
+            </a:r>
+            <a:endParaRPr/>
+          </a:p>
+        </p:txBody>
+      </p:sp>
     </p:spTree>
   </p:cSld>
   <p:clrMapOvr>
@@ -18471,13 +18643,13 @@
     <p:bg>
       <p:bgPr>
         <a:solidFill>
-          <a:srgbClr val="FFD966"/>
+          <a:srgbClr val="FFFFFF"/>
         </a:solidFill>
       </p:bgPr>
     </p:bg>
     <p:spTree>
       <p:nvGrpSpPr>
-        <p:cNvPr id="230" name="Shape 230"/>
+        <p:cNvPr id="240" name="Shape 240"/>
         <p:cNvGrpSpPr/>
         <p:nvPr/>
       </p:nvGrpSpPr>
@@ -18491,7 +18663,7 @@
       </p:grpSpPr>
       <p:sp>
         <p:nvSpPr>
-          <p:cNvPr id="231" name="Google Shape;231;p36"/>
+          <p:cNvPr id="241" name="Google Shape;241;p36"/>
           <p:cNvSpPr txBox="1"/>
           <p:nvPr>
             <p:ph type="ctrTitle"/>
@@ -18524,14 +18696,14 @@
             <a:r>
               <a:rPr lang="en">
                 <a:solidFill>
-                  <a:srgbClr val="000000"/>
+                  <a:srgbClr val="BF9000"/>
                 </a:solidFill>
               </a:rPr>
               <a:t>Depth Image</a:t>
             </a:r>
             <a:endParaRPr>
               <a:solidFill>
-                <a:srgbClr val="000000"/>
+                <a:srgbClr val="BF9000"/>
               </a:solidFill>
             </a:endParaRPr>
           </a:p>
@@ -18539,7 +18711,7 @@
       </p:sp>
       <p:sp>
         <p:nvSpPr>
-          <p:cNvPr id="232" name="Google Shape;232;p36"/>
+          <p:cNvPr id="242" name="Google Shape;242;p36"/>
           <p:cNvSpPr txBox="1"/>
           <p:nvPr>
             <p:ph idx="1" type="subTitle"/>
@@ -18629,6 +18801,92 @@
           </a:p>
         </p:txBody>
       </p:sp>
+      <p:sp>
+        <p:nvSpPr>
+          <p:cNvPr id="243" name="Google Shape;243;p36"/>
+          <p:cNvSpPr/>
+          <p:nvPr/>
+        </p:nvSpPr>
+        <p:spPr>
+          <a:xfrm>
+            <a:off x="8826675" y="-14850"/>
+            <a:ext cx="317400" cy="5143500"/>
+          </a:xfrm>
+          <a:prstGeom prst="rect">
+            <a:avLst/>
+          </a:prstGeom>
+          <a:solidFill>
+            <a:srgbClr val="BF9000"/>
+          </a:solidFill>
+          <a:ln>
+            <a:noFill/>
+          </a:ln>
+        </p:spPr>
+        <p:txBody>
+          <a:bodyPr anchorCtr="0" anchor="ctr" bIns="91425" lIns="91425" spcFirstLastPara="1" rIns="91425" wrap="square" tIns="91425">
+            <a:noAutofit/>
+          </a:bodyPr>
+          <a:lstStyle/>
+          <a:p>
+            <a:pPr indent="0" lvl="0" marL="0" rtl="0" algn="l">
+              <a:spcBef>
+                <a:spcPts val="0"/>
+              </a:spcBef>
+              <a:spcAft>
+                <a:spcPts val="0"/>
+              </a:spcAft>
+              <a:buNone/>
+            </a:pPr>
+            <a:r>
+              <a:t/>
+            </a:r>
+            <a:endParaRPr/>
+          </a:p>
+        </p:txBody>
+      </p:sp>
+      <p:sp>
+        <p:nvSpPr>
+          <p:cNvPr id="244" name="Google Shape;244;p36"/>
+          <p:cNvSpPr/>
+          <p:nvPr/>
+        </p:nvSpPr>
+        <p:spPr>
+          <a:xfrm>
+            <a:off x="0" y="0"/>
+            <a:ext cx="317400" cy="5143500"/>
+          </a:xfrm>
+          <a:prstGeom prst="rect">
+            <a:avLst/>
+          </a:prstGeom>
+          <a:solidFill>
+            <a:srgbClr val="BF9000"/>
+          </a:solidFill>
+          <a:ln>
+            <a:noFill/>
+          </a:ln>
+        </p:spPr>
+        <p:txBody>
+          <a:bodyPr anchorCtr="0" anchor="ctr" bIns="91425" lIns="91425" spcFirstLastPara="1" rIns="91425" wrap="square" tIns="91425">
+            <a:noAutofit/>
+          </a:bodyPr>
+          <a:lstStyle/>
+          <a:p>
+            <a:pPr indent="0" lvl="0" marL="0" rtl="0" algn="l">
+              <a:spcBef>
+                <a:spcPts val="0"/>
+              </a:spcBef>
+              <a:spcAft>
+                <a:spcPts val="0"/>
+              </a:spcAft>
+              <a:buNone/>
+            </a:pPr>
+            <a:r>
+              <a:t/>
+            </a:r>
+            <a:endParaRPr/>
+          </a:p>
+        </p:txBody>
+      </p:sp>
     </p:spTree>
   </p:cSld>
   <p:clrMapOvr>
@@ -18643,13 +18901,13 @@
     <p:bg>
       <p:bgPr>
         <a:solidFill>
-          <a:srgbClr val="FFD966"/>
+          <a:schemeClr val="lt1"/>
         </a:solidFill>
       </p:bgPr>
     </p:bg>
     <p:spTree>
       <p:nvGrpSpPr>
-        <p:cNvPr id="236" name="Shape 236"/>
+        <p:cNvPr id="248" name="Shape 248"/>
         <p:cNvGrpSpPr/>
         <p:nvPr/>
       </p:nvGrpSpPr>
@@ -18663,7 +18921,7 @@
       </p:grpSpPr>
       <p:sp>
         <p:nvSpPr>
-          <p:cNvPr id="237" name="Google Shape;237;p37"/>
+          <p:cNvPr id="249" name="Google Shape;249;p37"/>
           <p:cNvSpPr txBox="1"/>
           <p:nvPr>
             <p:ph type="title"/>
@@ -18696,14 +18954,14 @@
             <a:r>
               <a:rPr lang="en" sz="2400">
                 <a:solidFill>
-                  <a:srgbClr val="000000"/>
+                  <a:srgbClr val="BF9000"/>
                 </a:solidFill>
               </a:rPr>
               <a:t>Sample of Image along with extracted Depth Map</a:t>
             </a:r>
             <a:endParaRPr sz="2400">
               <a:solidFill>
-                <a:srgbClr val="000000"/>
+                <a:srgbClr val="BF9000"/>
               </a:solidFill>
             </a:endParaRPr>
           </a:p>
@@ -18711,7 +18969,7 @@
       </p:sp>
       <p:sp>
         <p:nvSpPr>
-          <p:cNvPr id="238" name="Google Shape;238;p37"/>
+          <p:cNvPr id="250" name="Google Shape;250;p37"/>
           <p:cNvSpPr txBox="1"/>
           <p:nvPr>
             <p:ph idx="1" type="body"/>
@@ -18766,7 +19024,7 @@
       </p:sp>
       <p:sp>
         <p:nvSpPr>
-          <p:cNvPr id="239" name="Google Shape;239;p37"/>
+          <p:cNvPr id="251" name="Google Shape;251;p37"/>
           <p:cNvSpPr txBox="1"/>
           <p:nvPr>
             <p:ph idx="2" type="body"/>
@@ -18806,7 +19064,7 @@
       </p:sp>
       <p:pic>
         <p:nvPicPr>
-          <p:cNvPr id="240" name="Google Shape;240;p37"/>
+          <p:cNvPr id="252" name="Google Shape;252;p37"/>
           <p:cNvPicPr preferRelativeResize="0"/>
           <p:nvPr/>
         </p:nvPicPr>
@@ -18834,7 +19092,7 @@
       </p:pic>
       <p:pic>
         <p:nvPicPr>
-          <p:cNvPr id="241" name="Google Shape;241;p37"/>
+          <p:cNvPr id="253" name="Google Shape;253;p37"/>
           <p:cNvPicPr preferRelativeResize="0"/>
           <p:nvPr/>
         </p:nvPicPr>
@@ -18860,6 +19118,92 @@
           </a:ln>
         </p:spPr>
       </p:pic>
+      <p:sp>
+        <p:nvSpPr>
+          <p:cNvPr id="254" name="Google Shape;254;p37"/>
+          <p:cNvSpPr/>
+          <p:nvPr/>
+        </p:nvSpPr>
+        <p:spPr>
+          <a:xfrm>
+            <a:off x="8826675" y="-14850"/>
+            <a:ext cx="317400" cy="5143500"/>
+          </a:xfrm>
+          <a:prstGeom prst="rect">
+            <a:avLst/>
+          </a:prstGeom>
+          <a:solidFill>
+            <a:srgbClr val="BF9000"/>
+          </a:solidFill>
+          <a:ln>
+            <a:noFill/>
+          </a:ln>
+        </p:spPr>
+        <p:txBody>
+          <a:bodyPr anchorCtr="0" anchor="ctr" bIns="91425" lIns="91425" spcFirstLastPara="1" rIns="91425" wrap="square" tIns="91425">
+            <a:noAutofit/>
+          </a:bodyPr>
+          <a:lstStyle/>
+          <a:p>
+            <a:pPr indent="0" lvl="0" marL="0" rtl="0" algn="l">
+              <a:spcBef>
+                <a:spcPts val="0"/>
+              </a:spcBef>
+              <a:spcAft>
+                <a:spcPts val="0"/>
+              </a:spcAft>
+              <a:buNone/>
+            </a:pPr>
+            <a:r>
+              <a:t/>
+            </a:r>
+            <a:endParaRPr/>
+          </a:p>
+        </p:txBody>
+      </p:sp>
+      <p:sp>
+        <p:nvSpPr>
+          <p:cNvPr id="255" name="Google Shape;255;p37"/>
+          <p:cNvSpPr/>
+          <p:nvPr/>
+        </p:nvSpPr>
+        <p:spPr>
+          <a:xfrm>
+            <a:off x="0" y="-14850"/>
+            <a:ext cx="317400" cy="5143500"/>
+          </a:xfrm>
+          <a:prstGeom prst="rect">
+            <a:avLst/>
+          </a:prstGeom>
+          <a:solidFill>
+            <a:srgbClr val="BF9000"/>
+          </a:solidFill>
+          <a:ln>
+            <a:noFill/>
+          </a:ln>
+        </p:spPr>
+        <p:txBody>
+          <a:bodyPr anchorCtr="0" anchor="ctr" bIns="91425" lIns="91425" spcFirstLastPara="1" rIns="91425" wrap="square" tIns="91425">
+            <a:noAutofit/>
+          </a:bodyPr>
+          <a:lstStyle/>
+          <a:p>
+            <a:pPr indent="0" lvl="0" marL="0" rtl="0" algn="l">
+              <a:spcBef>
+                <a:spcPts val="0"/>
+              </a:spcBef>
+              <a:spcAft>
+                <a:spcPts val="0"/>
+              </a:spcAft>
+              <a:buNone/>
+            </a:pPr>
+            <a:r>
+              <a:t/>
+            </a:r>
+            <a:endParaRPr/>
+          </a:p>
+        </p:txBody>
+      </p:sp>
     </p:spTree>
   </p:cSld>
   <p:clrMapOvr>
@@ -18874,13 +19218,13 @@
     <p:bg>
       <p:bgPr>
         <a:solidFill>
-          <a:srgbClr val="FFD966"/>
+          <a:srgbClr val="FFFFFF"/>
         </a:solidFill>
       </p:bgPr>
     </p:bg>
     <p:spTree>
       <p:nvGrpSpPr>
-        <p:cNvPr id="245" name="Shape 245"/>
+        <p:cNvPr id="259" name="Shape 259"/>
         <p:cNvGrpSpPr/>
         <p:nvPr/>
       </p:nvGrpSpPr>
@@ -18894,7 +19238,7 @@
       </p:grpSpPr>
       <p:sp>
         <p:nvSpPr>
-          <p:cNvPr id="246" name="Google Shape;246;p38"/>
+          <p:cNvPr id="260" name="Google Shape;260;p38"/>
           <p:cNvSpPr txBox="1"/>
           <p:nvPr>
             <p:ph type="title"/>
@@ -18925,16 +19269,24 @@
               <a:buNone/>
             </a:pPr>
             <a:r>
-              <a:rPr lang="en"/>
+              <a:rPr lang="en">
+                <a:solidFill>
+                  <a:srgbClr val="BF9000"/>
+                </a:solidFill>
+              </a:rPr>
               <a:t>Point cloud and mesh triangulation</a:t>
             </a:r>
-            <a:endParaRPr/>
+            <a:endParaRPr>
+              <a:solidFill>
+                <a:srgbClr val="BF9000"/>
+              </a:solidFill>
+            </a:endParaRPr>
           </a:p>
         </p:txBody>
       </p:sp>
       <p:sp>
         <p:nvSpPr>
-          <p:cNvPr id="247" name="Google Shape;247;p38"/>
+          <p:cNvPr id="261" name="Google Shape;261;p38"/>
           <p:cNvSpPr txBox="1"/>
           <p:nvPr>
             <p:ph idx="1" type="body"/>
@@ -18974,7 +19326,7 @@
       </p:sp>
       <p:sp>
         <p:nvSpPr>
-          <p:cNvPr id="248" name="Google Shape;248;p38"/>
+          <p:cNvPr id="262" name="Google Shape;262;p38"/>
           <p:cNvSpPr txBox="1"/>
           <p:nvPr>
             <p:ph idx="2" type="body"/>
@@ -19014,7 +19366,7 @@
       </p:sp>
       <p:pic>
         <p:nvPicPr>
-          <p:cNvPr id="249" name="Google Shape;249;p38"/>
+          <p:cNvPr id="263" name="Google Shape;263;p38"/>
           <p:cNvPicPr preferRelativeResize="0"/>
           <p:nvPr/>
         </p:nvPicPr>
@@ -19040,6 +19392,92 @@
           </a:ln>
         </p:spPr>
       </p:pic>
+      <p:sp>
+        <p:nvSpPr>
+          <p:cNvPr id="264" name="Google Shape;264;p38"/>
+          <p:cNvSpPr/>
+          <p:nvPr/>
+        </p:nvSpPr>
+        <p:spPr>
+          <a:xfrm>
+            <a:off x="8826675" y="-14850"/>
+            <a:ext cx="317400" cy="5143500"/>
+          </a:xfrm>
+          <a:prstGeom prst="rect">
+            <a:avLst/>
+          </a:prstGeom>
+          <a:solidFill>
+            <a:srgbClr val="BF9000"/>
+          </a:solidFill>
+          <a:ln>
+            <a:noFill/>
+          </a:ln>
+        </p:spPr>
+        <p:txBody>
+          <a:bodyPr anchorCtr="0" anchor="ctr" bIns="91425" lIns="91425" spcFirstLastPara="1" rIns="91425" wrap="square" tIns="91425">
+            <a:noAutofit/>
+          </a:bodyPr>
+          <a:lstStyle/>
+          <a:p>
+            <a:pPr indent="0" lvl="0" marL="0" rtl="0" algn="l">
+              <a:spcBef>
+                <a:spcPts val="0"/>
+              </a:spcBef>
+              <a:spcAft>
+                <a:spcPts val="0"/>
+              </a:spcAft>
+              <a:buNone/>
+            </a:pPr>
+            <a:r>
+              <a:t/>
+            </a:r>
+            <a:endParaRPr/>
+          </a:p>
+        </p:txBody>
+      </p:sp>
+      <p:sp>
+        <p:nvSpPr>
+          <p:cNvPr id="265" name="Google Shape;265;p38"/>
+          <p:cNvSpPr/>
+          <p:nvPr/>
+        </p:nvSpPr>
+        <p:spPr>
+          <a:xfrm>
+            <a:off x="0" y="-14850"/>
+            <a:ext cx="317400" cy="5143500"/>
+          </a:xfrm>
+          <a:prstGeom prst="rect">
+            <a:avLst/>
+          </a:prstGeom>
+          <a:solidFill>
+            <a:srgbClr val="BF9000"/>
+          </a:solidFill>
+          <a:ln>
+            <a:noFill/>
+          </a:ln>
+        </p:spPr>
+        <p:txBody>
+          <a:bodyPr anchorCtr="0" anchor="ctr" bIns="91425" lIns="91425" spcFirstLastPara="1" rIns="91425" wrap="square" tIns="91425">
+            <a:noAutofit/>
+          </a:bodyPr>
+          <a:lstStyle/>
+          <a:p>
+            <a:pPr indent="0" lvl="0" marL="0" rtl="0" algn="l">
+              <a:spcBef>
+                <a:spcPts val="0"/>
+              </a:spcBef>
+              <a:spcAft>
+                <a:spcPts val="0"/>
+              </a:spcAft>
+              <a:buNone/>
+            </a:pPr>
+            <a:r>
+              <a:t/>
+            </a:r>
+            <a:endParaRPr/>
+          </a:p>
+        </p:txBody>
+      </p:sp>
     </p:spTree>
   </p:cSld>
   <p:clrMapOvr>
@@ -19054,13 +19492,13 @@
     <p:bg>
       <p:bgPr>
         <a:solidFill>
-          <a:srgbClr val="FFD966"/>
+          <a:srgbClr val="FFFFFF"/>
         </a:solidFill>
       </p:bgPr>
     </p:bg>
     <p:spTree>
       <p:nvGrpSpPr>
-        <p:cNvPr id="253" name="Shape 253"/>
+        <p:cNvPr id="269" name="Shape 269"/>
         <p:cNvGrpSpPr/>
         <p:nvPr/>
       </p:nvGrpSpPr>
@@ -19074,7 +19512,7 @@
       </p:grpSpPr>
       <p:sp>
         <p:nvSpPr>
-          <p:cNvPr id="254" name="Google Shape;254;p39"/>
+          <p:cNvPr id="270" name="Google Shape;270;p39"/>
           <p:cNvSpPr txBox="1"/>
           <p:nvPr>
             <p:ph type="title"/>
@@ -19107,14 +19545,14 @@
             <a:r>
               <a:rPr lang="en">
                 <a:solidFill>
-                  <a:srgbClr val="000000"/>
+                  <a:srgbClr val="BF9000"/>
                 </a:solidFill>
               </a:rPr>
               <a:t>Point cloud and mesh triangulation</a:t>
             </a:r>
             <a:endParaRPr>
               <a:solidFill>
-                <a:srgbClr val="000000"/>
+                <a:srgbClr val="BF9000"/>
               </a:solidFill>
             </a:endParaRPr>
           </a:p>
@@ -19122,7 +19560,7 @@
       </p:sp>
       <p:sp>
         <p:nvSpPr>
-          <p:cNvPr id="255" name="Google Shape;255;p39"/>
+          <p:cNvPr id="271" name="Google Shape;271;p39"/>
           <p:cNvSpPr txBox="1"/>
           <p:nvPr>
             <p:ph idx="1" type="body"/>
@@ -19209,6 +19647,92 @@
           </a:p>
         </p:txBody>
       </p:sp>
+      <p:sp>
+        <p:nvSpPr>
+          <p:cNvPr id="272" name="Google Shape;272;p39"/>
+          <p:cNvSpPr/>
+          <p:nvPr/>
+        </p:nvSpPr>
+        <p:spPr>
+          <a:xfrm>
+            <a:off x="8826675" y="-14850"/>
+            <a:ext cx="317400" cy="5143500"/>
+          </a:xfrm>
+          <a:prstGeom prst="rect">
+            <a:avLst/>
+          </a:prstGeom>
+          <a:solidFill>
+            <a:srgbClr val="BF9000"/>
+          </a:solidFill>
+          <a:ln>
+            <a:noFill/>
+          </a:ln>
+        </p:spPr>
+        <p:txBody>
+          <a:bodyPr anchorCtr="0" anchor="ctr" bIns="91425" lIns="91425" spcFirstLastPara="1" rIns="91425" wrap="square" tIns="91425">
+            <a:noAutofit/>
+          </a:bodyPr>
+          <a:lstStyle/>
+          <a:p>
+            <a:pPr indent="0" lvl="0" marL="0" rtl="0" algn="l">
+              <a:spcBef>
+                <a:spcPts val="0"/>
+              </a:spcBef>
+              <a:spcAft>
+                <a:spcPts val="0"/>
+              </a:spcAft>
+              <a:buNone/>
+            </a:pPr>
+            <a:r>
+              <a:t/>
+            </a:r>
+            <a:endParaRPr/>
+          </a:p>
+        </p:txBody>
+      </p:sp>
+      <p:sp>
+        <p:nvSpPr>
+          <p:cNvPr id="273" name="Google Shape;273;p39"/>
+          <p:cNvSpPr/>
+          <p:nvPr/>
+        </p:nvSpPr>
+        <p:spPr>
+          <a:xfrm>
+            <a:off x="0" y="-14850"/>
+            <a:ext cx="317400" cy="5143500"/>
+          </a:xfrm>
+          <a:prstGeom prst="rect">
+            <a:avLst/>
+          </a:prstGeom>
+          <a:solidFill>
+            <a:srgbClr val="BF9000"/>
+          </a:solidFill>
+          <a:ln>
+            <a:noFill/>
+          </a:ln>
+        </p:spPr>
+        <p:txBody>
+          <a:bodyPr anchorCtr="0" anchor="ctr" bIns="91425" lIns="91425" spcFirstLastPara="1" rIns="91425" wrap="square" tIns="91425">
+            <a:noAutofit/>
+          </a:bodyPr>
+          <a:lstStyle/>
+          <a:p>
+            <a:pPr indent="0" lvl="0" marL="0" rtl="0" algn="l">
+              <a:spcBef>
+                <a:spcPts val="0"/>
+              </a:spcBef>
+              <a:spcAft>
+                <a:spcPts val="0"/>
+              </a:spcAft>
+              <a:buNone/>
+            </a:pPr>
+            <a:r>
+              <a:t/>
+            </a:r>
+            <a:endParaRPr/>
+          </a:p>
+        </p:txBody>
+      </p:sp>
     </p:spTree>
   </p:cSld>
   <p:clrMapOvr>
@@ -19222,7 +19746,7 @@
   <p:cSld>
     <p:spTree>
       <p:nvGrpSpPr>
-        <p:cNvPr id="259" name="Shape 259"/>
+        <p:cNvPr id="277" name="Shape 277"/>
         <p:cNvGrpSpPr/>
         <p:nvPr/>
       </p:nvGrpSpPr>
@@ -19236,7 +19760,7 @@
       </p:grpSpPr>
       <p:sp>
         <p:nvSpPr>
-          <p:cNvPr id="260" name="Google Shape;260;p40"/>
+          <p:cNvPr id="278" name="Google Shape;278;p40"/>
           <p:cNvSpPr txBox="1"/>
           <p:nvPr>
             <p:ph type="title"/>
@@ -19284,7 +19808,7 @@
       </p:sp>
       <p:sp>
         <p:nvSpPr>
-          <p:cNvPr id="261" name="Google Shape;261;p40"/>
+          <p:cNvPr id="279" name="Google Shape;279;p40"/>
           <p:cNvSpPr txBox="1"/>
           <p:nvPr>
             <p:ph idx="1" type="body"/>
@@ -19833,7 +20357,7 @@
               <a:avLst/>
             </a:prstGeom>
             <a:solidFill>
-              <a:srgbClr val="EFEFEF"/>
+              <a:srgbClr val="999999"/>
             </a:solidFill>
             <a:ln>
               <a:noFill/>
@@ -20198,7 +20722,7 @@
               <a:avLst/>
             </a:prstGeom>
             <a:solidFill>
-              <a:srgbClr val="FFD966"/>
+              <a:srgbClr val="BF9000"/>
             </a:solidFill>
             <a:ln>
               <a:noFill/>
@@ -21301,7 +21825,7 @@
     <p:bg>
       <p:bgPr>
         <a:solidFill>
-          <a:schemeClr val="accent3"/>
+          <a:srgbClr val="FFFFFF"/>
         </a:solidFill>
       </p:bgPr>
     </p:bg>
@@ -21336,7 +21860,7 @@
             <a:avLst/>
           </a:prstGeom>
           <a:solidFill>
-            <a:schemeClr val="accent3"/>
+            <a:srgbClr val="FFFFFF"/>
           </a:solidFill>
         </p:spPr>
         <p:txBody>
@@ -21355,18 +21879,10 @@
               <a:buNone/>
             </a:pPr>
             <a:r>
-              <a:rPr lang="en">
-                <a:solidFill>
-                  <a:srgbClr val="FFFFFF"/>
-                </a:solidFill>
-              </a:rPr>
+              <a:rPr lang="en"/>
               <a:t>GAN Architecture</a:t>
             </a:r>
-            <a:endParaRPr>
-              <a:solidFill>
-                <a:srgbClr val="FFFFFF"/>
-              </a:solidFill>
-            </a:endParaRPr>
+            <a:endParaRPr/>
           </a:p>
         </p:txBody>
       </p:sp>
@@ -21386,7 +21902,7 @@
         </p:blipFill>
         <p:spPr>
           <a:xfrm>
-            <a:off x="311700" y="1695992"/>
+            <a:off x="311700" y="1648367"/>
             <a:ext cx="8520600" cy="1985308"/>
           </a:xfrm>
           <a:prstGeom prst="rect">
@@ -21398,6 +21914,104 @@
           </a:ln>
         </p:spPr>
       </p:pic>
+      <p:sp>
+        <p:nvSpPr>
+          <p:cNvPr id="194" name="Google Shape;194;p31"/>
+          <p:cNvSpPr/>
+          <p:nvPr/>
+        </p:nvSpPr>
+        <p:spPr>
+          <a:xfrm>
+            <a:off x="8826675" y="-14850"/>
+            <a:ext cx="317400" cy="5143500"/>
+          </a:xfrm>
+          <a:prstGeom prst="rect">
+            <a:avLst/>
+          </a:prstGeom>
+          <a:solidFill>
+            <a:schemeClr val="accent3"/>
+          </a:solidFill>
+          <a:ln cap="flat" cmpd="sng" w="9525">
+            <a:solidFill>
+              <a:srgbClr val="FFFFFF"/>
+            </a:solidFill>
+            <a:prstDash val="solid"/>
+            <a:round/>
+            <a:headEnd len="sm" w="sm" type="none"/>
+            <a:tailEnd len="sm" w="sm" type="none"/>
+          </a:ln>
+        </p:spPr>
+        <p:txBody>
+          <a:bodyPr anchorCtr="0" anchor="ctr" bIns="91425" lIns="91425" spcFirstLastPara="1" rIns="91425" wrap="square" tIns="91425">
+            <a:noAutofit/>
+          </a:bodyPr>
+          <a:lstStyle/>
+          <a:p>
+            <a:pPr indent="0" lvl="0" marL="0" rtl="0" algn="l">
+              <a:spcBef>
+                <a:spcPts val="0"/>
+              </a:spcBef>
+              <a:spcAft>
+                <a:spcPts val="0"/>
+              </a:spcAft>
+              <a:buNone/>
+            </a:pPr>
+            <a:r>
+              <a:t/>
+            </a:r>
+            <a:endParaRPr/>
+          </a:p>
+        </p:txBody>
+      </p:sp>
+      <p:sp>
+        <p:nvSpPr>
+          <p:cNvPr id="195" name="Google Shape;195;p31"/>
+          <p:cNvSpPr/>
+          <p:nvPr/>
+        </p:nvSpPr>
+        <p:spPr>
+          <a:xfrm>
+            <a:off x="0" y="0"/>
+            <a:ext cx="317400" cy="5143500"/>
+          </a:xfrm>
+          <a:prstGeom prst="rect">
+            <a:avLst/>
+          </a:prstGeom>
+          <a:solidFill>
+            <a:schemeClr val="accent3"/>
+          </a:solidFill>
+          <a:ln cap="flat" cmpd="sng" w="9525">
+            <a:solidFill>
+              <a:srgbClr val="FFFFFF"/>
+            </a:solidFill>
+            <a:prstDash val="solid"/>
+            <a:round/>
+            <a:headEnd len="sm" w="sm" type="none"/>
+            <a:tailEnd len="sm" w="sm" type="none"/>
+          </a:ln>
+        </p:spPr>
+        <p:txBody>
+          <a:bodyPr anchorCtr="0" anchor="ctr" bIns="91425" lIns="91425" spcFirstLastPara="1" rIns="91425" wrap="square" tIns="91425">
+            <a:noAutofit/>
+          </a:bodyPr>
+          <a:lstStyle/>
+          <a:p>
+            <a:pPr indent="0" lvl="0" marL="0" rtl="0" algn="l">
+              <a:spcBef>
+                <a:spcPts val="0"/>
+              </a:spcBef>
+              <a:spcAft>
+                <a:spcPts val="0"/>
+              </a:spcAft>
+              <a:buNone/>
+            </a:pPr>
+            <a:r>
+              <a:t/>
+            </a:r>
+            <a:endParaRPr/>
+          </a:p>
+        </p:txBody>
+      </p:sp>
     </p:spTree>
   </p:cSld>
   <p:clrMapOvr>
@@ -21412,13 +22026,13 @@
     <p:bg>
       <p:bgPr>
         <a:solidFill>
-          <a:schemeClr val="accent3"/>
+          <a:srgbClr val="FFFFFF"/>
         </a:solidFill>
       </p:bgPr>
     </p:bg>
     <p:spTree>
       <p:nvGrpSpPr>
-        <p:cNvPr id="197" name="Shape 197"/>
+        <p:cNvPr id="199" name="Shape 199"/>
         <p:cNvGrpSpPr/>
         <p:nvPr/>
       </p:nvGrpSpPr>
@@ -21432,7 +22046,7 @@
       </p:grpSpPr>
       <p:sp>
         <p:nvSpPr>
-          <p:cNvPr id="198" name="Google Shape;198;p32"/>
+          <p:cNvPr id="200" name="Google Shape;200;p32"/>
           <p:cNvSpPr txBox="1"/>
           <p:nvPr>
             <p:ph type="title"/>
@@ -21463,16 +22077,27 @@
               <a:buNone/>
             </a:pPr>
             <a:r>
-              <a:rPr lang="en">
-                <a:solidFill>
-                  <a:srgbClr val="FFFFFF"/>
-                </a:solidFill>
-              </a:rPr>
-              <a:t>Outputs</a:t>
+              <a:rPr lang="en"/>
+              <a:t>OUTPUT</a:t>
+            </a:r>
+            <a:endParaRPr/>
+          </a:p>
+          <a:p>
+            <a:pPr indent="0" lvl="0" marL="0" rtl="0" algn="l">
+              <a:spcBef>
+                <a:spcPts val="0"/>
+              </a:spcBef>
+              <a:spcAft>
+                <a:spcPts val="0"/>
+              </a:spcAft>
+              <a:buNone/>
+            </a:pPr>
+            <a:r>
+              <a:t/>
             </a:r>
             <a:endParaRPr>
               <a:solidFill>
-                <a:srgbClr val="FFFFFF"/>
+                <a:srgbClr val="000000"/>
               </a:solidFill>
             </a:endParaRPr>
           </a:p>
@@ -21480,7 +22105,7 @@
       </p:sp>
       <p:sp>
         <p:nvSpPr>
-          <p:cNvPr id="199" name="Google Shape;199;p32"/>
+          <p:cNvPr id="201" name="Google Shape;201;p32"/>
           <p:cNvSpPr txBox="1"/>
           <p:nvPr>
             <p:ph idx="1" type="body"/>
@@ -21513,7 +22138,7 @@
             <a:r>
               <a:rPr lang="en">
                 <a:solidFill>
-                  <a:srgbClr val="FFFFFF"/>
+                  <a:srgbClr val="000000"/>
                 </a:solidFill>
               </a:rPr>
               <a:t>Dog</a:t>
@@ -21521,14 +22146,14 @@
             <a:r>
               <a:rPr lang="en">
                 <a:solidFill>
-                  <a:srgbClr val="FFFFFF"/>
+                  <a:srgbClr val="000000"/>
                 </a:solidFill>
               </a:rPr>
               <a:t> Generation					Dandelion Generation</a:t>
             </a:r>
             <a:endParaRPr>
               <a:solidFill>
-                <a:srgbClr val="FFFFFF"/>
+                <a:srgbClr val="000000"/>
               </a:solidFill>
             </a:endParaRPr>
           </a:p>
@@ -21536,7 +22161,7 @@
       </p:sp>
       <p:pic>
         <p:nvPicPr>
-          <p:cNvPr id="200" name="Google Shape;200;p32"/>
+          <p:cNvPr id="202" name="Google Shape;202;p32"/>
           <p:cNvPicPr preferRelativeResize="0"/>
           <p:nvPr/>
         </p:nvPicPr>
@@ -21563,7 +22188,7 @@
       </p:pic>
       <p:pic>
         <p:nvPicPr>
-          <p:cNvPr id="201" name="Google Shape;201;p32"/>
+          <p:cNvPr id="203" name="Google Shape;203;p32"/>
           <p:cNvPicPr preferRelativeResize="0"/>
           <p:nvPr/>
         </p:nvPicPr>
@@ -21588,6 +22213,104 @@
           </a:ln>
         </p:spPr>
       </p:pic>
+      <p:sp>
+        <p:nvSpPr>
+          <p:cNvPr id="204" name="Google Shape;204;p32"/>
+          <p:cNvSpPr/>
+          <p:nvPr/>
+        </p:nvSpPr>
+        <p:spPr>
+          <a:xfrm>
+            <a:off x="8826675" y="-14850"/>
+            <a:ext cx="317400" cy="5143500"/>
+          </a:xfrm>
+          <a:prstGeom prst="rect">
+            <a:avLst/>
+          </a:prstGeom>
+          <a:solidFill>
+            <a:schemeClr val="accent3"/>
+          </a:solidFill>
+          <a:ln cap="flat" cmpd="sng" w="9525">
+            <a:solidFill>
+              <a:srgbClr val="FFFFFF"/>
+            </a:solidFill>
+            <a:prstDash val="solid"/>
+            <a:round/>
+            <a:headEnd len="sm" w="sm" type="none"/>
+            <a:tailEnd len="sm" w="sm" type="none"/>
+          </a:ln>
+        </p:spPr>
+        <p:txBody>
+          <a:bodyPr anchorCtr="0" anchor="ctr" bIns="91425" lIns="91425" spcFirstLastPara="1" rIns="91425" wrap="square" tIns="91425">
+            <a:noAutofit/>
+          </a:bodyPr>
+          <a:lstStyle/>
+          <a:p>
+            <a:pPr indent="0" lvl="0" marL="0" rtl="0" algn="l">
+              <a:spcBef>
+                <a:spcPts val="0"/>
+              </a:spcBef>
+              <a:spcAft>
+                <a:spcPts val="0"/>
+              </a:spcAft>
+              <a:buNone/>
+            </a:pPr>
+            <a:r>
+              <a:t/>
+            </a:r>
+            <a:endParaRPr/>
+          </a:p>
+        </p:txBody>
+      </p:sp>
+      <p:sp>
+        <p:nvSpPr>
+          <p:cNvPr id="205" name="Google Shape;205;p32"/>
+          <p:cNvSpPr/>
+          <p:nvPr/>
+        </p:nvSpPr>
+        <p:spPr>
+          <a:xfrm>
+            <a:off x="0" y="-14850"/>
+            <a:ext cx="317400" cy="5143500"/>
+          </a:xfrm>
+          <a:prstGeom prst="rect">
+            <a:avLst/>
+          </a:prstGeom>
+          <a:solidFill>
+            <a:schemeClr val="accent3"/>
+          </a:solidFill>
+          <a:ln cap="flat" cmpd="sng" w="9525">
+            <a:solidFill>
+              <a:srgbClr val="FFFFFF"/>
+            </a:solidFill>
+            <a:prstDash val="solid"/>
+            <a:round/>
+            <a:headEnd len="sm" w="sm" type="none"/>
+            <a:tailEnd len="sm" w="sm" type="none"/>
+          </a:ln>
+        </p:spPr>
+        <p:txBody>
+          <a:bodyPr anchorCtr="0" anchor="ctr" bIns="91425" lIns="91425" spcFirstLastPara="1" rIns="91425" wrap="square" tIns="91425">
+            <a:noAutofit/>
+          </a:bodyPr>
+          <a:lstStyle/>
+          <a:p>
+            <a:pPr indent="0" lvl="0" marL="0" rtl="0" algn="l">
+              <a:spcBef>
+                <a:spcPts val="0"/>
+              </a:spcBef>
+              <a:spcAft>
+                <a:spcPts val="0"/>
+              </a:spcAft>
+              <a:buNone/>
+            </a:pPr>
+            <a:r>
+              <a:t/>
+            </a:r>
+            <a:endParaRPr/>
+          </a:p>
+        </p:txBody>
+      </p:sp>
     </p:spTree>
   </p:cSld>
   <p:clrMapOvr>
@@ -21602,13 +22325,13 @@
     <p:bg>
       <p:bgPr>
         <a:solidFill>
-          <a:srgbClr val="D9D9D9"/>
+          <a:srgbClr val="FFFFFF"/>
         </a:solidFill>
       </p:bgPr>
     </p:bg>
     <p:spTree>
       <p:nvGrpSpPr>
-        <p:cNvPr id="205" name="Shape 205"/>
+        <p:cNvPr id="209" name="Shape 209"/>
         <p:cNvGrpSpPr/>
         <p:nvPr/>
       </p:nvGrpSpPr>
@@ -21622,7 +22345,7 @@
       </p:grpSpPr>
       <p:sp>
         <p:nvSpPr>
-          <p:cNvPr id="206" name="Google Shape;206;p33"/>
+          <p:cNvPr id="210" name="Google Shape;210;p33"/>
           <p:cNvSpPr txBox="1"/>
           <p:nvPr>
             <p:ph type="ctrTitle"/>
@@ -21636,6 +22359,9 @@
           <a:prstGeom prst="rect">
             <a:avLst/>
           </a:prstGeom>
+          <a:solidFill>
+            <a:srgbClr val="FFFFFF"/>
+          </a:solidFill>
         </p:spPr>
         <p:txBody>
           <a:bodyPr anchorCtr="0" anchor="b" bIns="91425" lIns="91425" spcFirstLastPara="1" rIns="91425" wrap="square" tIns="91425">
@@ -21655,14 +22381,14 @@
             <a:r>
               <a:rPr lang="en">
                 <a:solidFill>
-                  <a:srgbClr val="000000"/>
+                  <a:srgbClr val="999999"/>
                 </a:solidFill>
               </a:rPr>
               <a:t>Human Modelling and Texture Wrapping</a:t>
             </a:r>
             <a:endParaRPr>
               <a:solidFill>
-                <a:srgbClr val="000000"/>
+                <a:srgbClr val="999999"/>
               </a:solidFill>
             </a:endParaRPr>
           </a:p>
@@ -21670,7 +22396,7 @@
       </p:sp>
       <p:sp>
         <p:nvSpPr>
-          <p:cNvPr id="207" name="Google Shape;207;p33"/>
+          <p:cNvPr id="211" name="Google Shape;211;p33"/>
           <p:cNvSpPr txBox="1"/>
           <p:nvPr>
             <p:ph idx="1" type="subTitle"/>
@@ -21741,6 +22467,92 @@
           </a:p>
         </p:txBody>
       </p:sp>
+      <p:sp>
+        <p:nvSpPr>
+          <p:cNvPr id="212" name="Google Shape;212;p33"/>
+          <p:cNvSpPr/>
+          <p:nvPr/>
+        </p:nvSpPr>
+        <p:spPr>
+          <a:xfrm>
+            <a:off x="8826675" y="-14850"/>
+            <a:ext cx="317400" cy="5143500"/>
+          </a:xfrm>
+          <a:prstGeom prst="rect">
+            <a:avLst/>
+          </a:prstGeom>
+          <a:solidFill>
+            <a:srgbClr val="999999"/>
+          </a:solidFill>
+          <a:ln>
+            <a:noFill/>
+          </a:ln>
+        </p:spPr>
+        <p:txBody>
+          <a:bodyPr anchorCtr="0" anchor="ctr" bIns="91425" lIns="91425" spcFirstLastPara="1" rIns="91425" wrap="square" tIns="91425">
+            <a:noAutofit/>
+          </a:bodyPr>
+          <a:lstStyle/>
+          <a:p>
+            <a:pPr indent="0" lvl="0" marL="0" rtl="0" algn="l">
+              <a:spcBef>
+                <a:spcPts val="0"/>
+              </a:spcBef>
+              <a:spcAft>
+                <a:spcPts val="0"/>
+              </a:spcAft>
+              <a:buNone/>
+            </a:pPr>
+            <a:r>
+              <a:t/>
+            </a:r>
+            <a:endParaRPr/>
+          </a:p>
+        </p:txBody>
+      </p:sp>
+      <p:sp>
+        <p:nvSpPr>
+          <p:cNvPr id="213" name="Google Shape;213;p33"/>
+          <p:cNvSpPr/>
+          <p:nvPr/>
+        </p:nvSpPr>
+        <p:spPr>
+          <a:xfrm>
+            <a:off x="0" y="0"/>
+            <a:ext cx="317400" cy="5143500"/>
+          </a:xfrm>
+          <a:prstGeom prst="rect">
+            <a:avLst/>
+          </a:prstGeom>
+          <a:solidFill>
+            <a:srgbClr val="999999"/>
+          </a:solidFill>
+          <a:ln>
+            <a:noFill/>
+          </a:ln>
+        </p:spPr>
+        <p:txBody>
+          <a:bodyPr anchorCtr="0" anchor="ctr" bIns="91425" lIns="91425" spcFirstLastPara="1" rIns="91425" wrap="square" tIns="91425">
+            <a:noAutofit/>
+          </a:bodyPr>
+          <a:lstStyle/>
+          <a:p>
+            <a:pPr indent="0" lvl="0" marL="0" rtl="0" algn="l">
+              <a:spcBef>
+                <a:spcPts val="0"/>
+              </a:spcBef>
+              <a:spcAft>
+                <a:spcPts val="0"/>
+              </a:spcAft>
+              <a:buNone/>
+            </a:pPr>
+            <a:r>
+              <a:t/>
+            </a:r>
+            <a:endParaRPr/>
+          </a:p>
+        </p:txBody>
+      </p:sp>
     </p:spTree>
   </p:cSld>
   <p:clrMapOvr>
@@ -21750,6 +22562,285 @@
 </file>
 
 <file path=ppt/theme/theme1.xml><?xml version="1.0" encoding="utf-8"?>
+<a:theme xmlns:a="http://schemas.openxmlformats.org/drawingml/2006/main" xmlns:r="http://schemas.openxmlformats.org/officeDocument/2006/relationships">
+  <a:themeElements>
+    <a:clrScheme name="Default">
+      <a:dk1>
+        <a:srgbClr val="000000"/>
+      </a:dk1>
+      <a:lt1>
+        <a:srgbClr val="FFFFFF"/>
+      </a:lt1>
+      <a:dk2>
+        <a:srgbClr val="158158"/>
+      </a:dk2>
+      <a:lt2>
+        <a:srgbClr val="F3F3F3"/>
+      </a:lt2>
+      <a:accent1>
+        <a:srgbClr val="058DC7"/>
+      </a:accent1>
+      <a:accent2>
+        <a:srgbClr val="50B432"/>
+      </a:accent2>
+      <a:accent3>
+        <a:srgbClr val="ED561B"/>
+      </a:accent3>
+      <a:accent4>
+        <a:srgbClr val="EDEF00"/>
+      </a:accent4>
+      <a:accent5>
+        <a:srgbClr val="24CBE5"/>
+      </a:accent5>
+      <a:accent6>
+        <a:srgbClr val="64E572"/>
+      </a:accent6>
+      <a:hlink>
+        <a:srgbClr val="2200CC"/>
+      </a:hlink>
+      <a:folHlink>
+        <a:srgbClr val="551A8B"/>
+      </a:folHlink>
+    </a:clrScheme>
+    <a:fontScheme name="Office">
+      <a:majorFont>
+        <a:latin typeface="Arial"/>
+        <a:ea typeface=""/>
+        <a:cs typeface=""/>
+        <a:font script="Jpan" typeface="ＭＳ Ｐゴシック"/>
+        <a:font script="Hang" typeface="맑은 고딕"/>
+        <a:font script="Hans" typeface="宋体"/>
+        <a:font script="Hant" typeface="新細明體"/>
+        <a:font script="Arab" typeface="Times New Roman"/>
+        <a:font script="Hebr" typeface="Times New Roman"/>
+        <a:font script="Thai" typeface="Angsana New"/>
+        <a:font script="Ethi" typeface="Nyala"/>
+        <a:font script="Beng" typeface="Vrinda"/>
+        <a:font script="Gujr" typeface="Shruti"/>
+        <a:font script="Khmr" typeface="MoolBoran"/>
+        <a:font script="Knda" typeface="Tunga"/>
+        <a:font script="Guru" typeface="Raavi"/>
+        <a:font script="Cans" typeface="Euphemia"/>
+        <a:font script="Cher" typeface="Plantagenet Cherokee"/>
+        <a:font script="Yiii" typeface="Microsoft Yi Baiti"/>
+        <a:font script="Tibt" typeface="Microsoft Himalaya"/>
+        <a:font script="Thaa" typeface="MV Boli"/>
+        <a:font script="Deva" typeface="Mangal"/>
+        <a:font script="Telu" typeface="Gautami"/>
+        <a:font script="Taml" typeface="Latha"/>
+        <a:font script="Syrc" typeface="Estrangelo Edessa"/>
+        <a:font script="Orya" typeface="Kalinga"/>
+        <a:font script="Mlym" typeface="Kartika"/>
+        <a:font script="Laoo" typeface="DokChampa"/>
+        <a:font script="Sinh" typeface="Iskoola Pota"/>
+        <a:font script="Mong" typeface="Mongolian Baiti"/>
+        <a:font script="Viet" typeface="Times New Roman"/>
+        <a:font script="Uigh" typeface="Microsoft Uighur"/>
+        <a:font script="Geor" typeface="Sylfaen"/>
+      </a:majorFont>
+      <a:minorFont>
+        <a:latin typeface="Arial"/>
+        <a:ea typeface=""/>
+        <a:cs typeface=""/>
+        <a:font script="Jpan" typeface="ＭＳ Ｐゴシック"/>
+        <a:font script="Hang" typeface="맑은 고딕"/>
+        <a:font script="Hans" typeface="宋体"/>
+        <a:font script="Hant" typeface="新細明體"/>
+        <a:font script="Arab" typeface="Arial"/>
+        <a:font script="Hebr" typeface="Arial"/>
+        <a:font script="Thai" typeface="Cordia New"/>
+        <a:font script="Ethi" typeface="Nyala"/>
+        <a:font script="Beng" typeface="Vrinda"/>
+        <a:font script="Gujr" typeface="Shruti"/>
+        <a:font script="Khmr" typeface="DaunPenh"/>
+        <a:font script="Knda" typeface="Tunga"/>
+        <a:font script="Guru" typeface="Raavi"/>
+        <a:font script="Cans" typeface="Euphemia"/>
+        <a:font script="Cher" typeface="Plantagenet Cherokee"/>
+        <a:font script="Yiii" typeface="Microsoft Yi Baiti"/>
+        <a:font script="Tibt" typeface="Microsoft Himalaya"/>
+        <a:font script="Thaa" typeface="MV Boli"/>
+        <a:font script="Deva" typeface="Mangal"/>
+        <a:font script="Telu" typeface="Gautami"/>
+        <a:font script="Taml" typeface="Latha"/>
+        <a:font script="Syrc" typeface="Estrangelo Edessa"/>
+        <a:font script="Orya" typeface="Kalinga"/>
+        <a:font script="Mlym" typeface="Kartika"/>
+        <a:font script="Laoo" typeface="DokChampa"/>
+        <a:font script="Sinh" typeface="Iskoola Pota"/>
+        <a:font script="Mong" typeface="Mongolian Baiti"/>
+        <a:font script="Viet" typeface="Arial"/>
+        <a:font script="Uigh" typeface="Microsoft Uighur"/>
+        <a:font script="Geor" typeface="Sylfaen"/>
+      </a:minorFont>
+    </a:fontScheme>
+    <a:fmtScheme name="Office">
+      <a:fillStyleLst>
+        <a:solidFill>
+          <a:schemeClr val="phClr"/>
+        </a:solidFill>
+        <a:gradFill rotWithShape="1">
+          <a:gsLst>
+            <a:gs pos="0">
+              <a:schemeClr val="phClr">
+                <a:tint val="50000"/>
+                <a:satMod val="300000"/>
+              </a:schemeClr>
+            </a:gs>
+            <a:gs pos="35000">
+              <a:schemeClr val="phClr">
+                <a:tint val="37000"/>
+                <a:satMod val="300000"/>
+              </a:schemeClr>
+            </a:gs>
+            <a:gs pos="100000">
+              <a:schemeClr val="phClr">
+                <a:tint val="15000"/>
+                <a:satMod val="350000"/>
+              </a:schemeClr>
+            </a:gs>
+          </a:gsLst>
+          <a:lin ang="16200000" scaled="1"/>
+        </a:gradFill>
+        <a:gradFill rotWithShape="1">
+          <a:gsLst>
+            <a:gs pos="0">
+              <a:schemeClr val="phClr">
+                <a:tint val="100000"/>
+                <a:shade val="100000"/>
+                <a:satMod val="130000"/>
+              </a:schemeClr>
+            </a:gs>
+            <a:gs pos="100000">
+              <a:schemeClr val="phClr">
+                <a:tint val="50000"/>
+                <a:shade val="100000"/>
+                <a:satMod val="350000"/>
+              </a:schemeClr>
+            </a:gs>
+          </a:gsLst>
+          <a:lin ang="16200000" scaled="0"/>
+        </a:gradFill>
+      </a:fillStyleLst>
+      <a:lnStyleLst>
+        <a:ln w="9525" cap="flat" cmpd="sng" algn="ctr">
+          <a:solidFill>
+            <a:schemeClr val="phClr">
+              <a:shade val="95000"/>
+              <a:satMod val="105000"/>
+            </a:schemeClr>
+          </a:solidFill>
+          <a:prstDash val="solid"/>
+        </a:ln>
+        <a:ln w="25400" cap="flat" cmpd="sng" algn="ctr">
+          <a:solidFill>
+            <a:schemeClr val="phClr"/>
+          </a:solidFill>
+          <a:prstDash val="solid"/>
+        </a:ln>
+        <a:ln w="38100" cap="flat" cmpd="sng" algn="ctr">
+          <a:solidFill>
+            <a:schemeClr val="phClr"/>
+          </a:solidFill>
+          <a:prstDash val="solid"/>
+        </a:ln>
+      </a:lnStyleLst>
+      <a:effectStyleLst>
+        <a:effectStyle>
+          <a:effectLst>
+            <a:outerShdw blurRad="40000" dist="20000" dir="5400000" rotWithShape="0">
+              <a:srgbClr val="000000">
+                <a:alpha val="38000"/>
+              </a:srgbClr>
+            </a:outerShdw>
+          </a:effectLst>
+        </a:effectStyle>
+        <a:effectStyle>
+          <a:effectLst>
+            <a:outerShdw blurRad="40000" dist="23000" dir="5400000" rotWithShape="0">
+              <a:srgbClr val="000000">
+                <a:alpha val="35000"/>
+              </a:srgbClr>
+            </a:outerShdw>
+          </a:effectLst>
+        </a:effectStyle>
+        <a:effectStyle>
+          <a:effectLst>
+            <a:outerShdw blurRad="40000" dist="23000" dir="5400000" rotWithShape="0">
+              <a:srgbClr val="000000">
+                <a:alpha val="35000"/>
+              </a:srgbClr>
+            </a:outerShdw>
+          </a:effectLst>
+          <a:scene3d>
+            <a:camera prst="orthographicFront">
+              <a:rot lat="0" lon="0" rev="0"/>
+            </a:camera>
+            <a:lightRig rig="threePt" dir="t">
+              <a:rot lat="0" lon="0" rev="1200000"/>
+            </a:lightRig>
+          </a:scene3d>
+          <a:sp3d>
+            <a:bevelT w="63500" h="25400"/>
+          </a:sp3d>
+        </a:effectStyle>
+      </a:effectStyleLst>
+      <a:bgFillStyleLst>
+        <a:solidFill>
+          <a:schemeClr val="phClr"/>
+        </a:solidFill>
+        <a:gradFill rotWithShape="1">
+          <a:gsLst>
+            <a:gs pos="0">
+              <a:schemeClr val="phClr">
+                <a:tint val="40000"/>
+                <a:satMod val="350000"/>
+              </a:schemeClr>
+            </a:gs>
+            <a:gs pos="40000">
+              <a:schemeClr val="phClr">
+                <a:tint val="45000"/>
+                <a:shade val="99000"/>
+                <a:satMod val="350000"/>
+              </a:schemeClr>
+            </a:gs>
+            <a:gs pos="100000">
+              <a:schemeClr val="phClr">
+                <a:shade val="20000"/>
+                <a:satMod val="255000"/>
+              </a:schemeClr>
+            </a:gs>
+          </a:gsLst>
+          <a:path path="circle">
+            <a:fillToRect l="50000" t="-80000" r="50000" b="180000"/>
+          </a:path>
+        </a:gradFill>
+        <a:gradFill rotWithShape="1">
+          <a:gsLst>
+            <a:gs pos="0">
+              <a:schemeClr val="phClr">
+                <a:tint val="80000"/>
+                <a:satMod val="300000"/>
+              </a:schemeClr>
+            </a:gs>
+            <a:gs pos="100000">
+              <a:schemeClr val="phClr">
+                <a:shade val="30000"/>
+                <a:satMod val="200000"/>
+              </a:schemeClr>
+            </a:gs>
+          </a:gsLst>
+          <a:path path="circle">
+            <a:fillToRect l="50000" t="50000" r="50000" b="50000"/>
+          </a:path>
+        </a:gradFill>
+      </a:bgFillStyleLst>
+    </a:fmtScheme>
+  </a:themeElements>
+</a:theme>
+</file>
+
+<file path=ppt/theme/theme2.xml><?xml version="1.0" encoding="utf-8"?>
 <a:theme xmlns:a="http://schemas.openxmlformats.org/drawingml/2006/main" xmlns:r="http://schemas.openxmlformats.org/officeDocument/2006/relationships" name="Gameday">
   <a:themeElements>
     <a:clrScheme name="Gameday">
@@ -22028,7 +23119,7 @@
 </a:theme>
 </file>
 
-<file path=ppt/theme/theme2.xml><?xml version="1.0" encoding="utf-8"?>
+<file path=ppt/theme/theme3.xml><?xml version="1.0" encoding="utf-8"?>
 <a:theme xmlns:a="http://schemas.openxmlformats.org/drawingml/2006/main" xmlns:r="http://schemas.openxmlformats.org/officeDocument/2006/relationships" name="Office Theme">
   <a:themeElements>
     <a:clrScheme name="Office">
@@ -22305,283 +23396,4 @@
     </a:fmtScheme>
   </a:themeElements>
 </a:theme>
-</file>
-
-<file path=ppt/theme/theme3.xml><?xml version="1.0" encoding="utf-8"?>
-<a:theme xmlns:a="http://schemas.openxmlformats.org/drawingml/2006/main" xmlns:r="http://schemas.openxmlformats.org/officeDocument/2006/relationships">
-  <a:themeElements>
-    <a:clrScheme name="Default">
-      <a:dk1>
-        <a:srgbClr val="000000"/>
-      </a:dk1>
-      <a:lt1>
-        <a:srgbClr val="FFFFFF"/>
-      </a:lt1>
-      <a:dk2>
-        <a:srgbClr val="158158"/>
-      </a:dk2>
-      <a:lt2>
-        <a:srgbClr val="F3F3F3"/>
-      </a:lt2>
-      <a:accent1>
-        <a:srgbClr val="058DC7"/>
-      </a:accent1>
-      <a:accent2>
-        <a:srgbClr val="50B432"/>
-      </a:accent2>
-      <a:accent3>
-        <a:srgbClr val="ED561B"/>
-      </a:accent3>
-      <a:accent4>
-        <a:srgbClr val="EDEF00"/>
-      </a:accent4>
-      <a:accent5>
-        <a:srgbClr val="24CBE5"/>
-      </a:accent5>
-      <a:accent6>
-        <a:srgbClr val="64E572"/>
-      </a:accent6>
-      <a:hlink>
-        <a:srgbClr val="2200CC"/>
-      </a:hlink>
-      <a:folHlink>
-        <a:srgbClr val="551A8B"/>
-      </a:folHlink>
-    </a:clrScheme>
-    <a:fontScheme name="Office">
-      <a:majorFont>
-        <a:latin typeface="Arial"/>
-        <a:ea typeface=""/>
-        <a:cs typeface=""/>
-        <a:font script="Jpan" typeface="ＭＳ Ｐゴシック"/>
-        <a:font script="Hang" typeface="맑은 고딕"/>
-        <a:font script="Hans" typeface="宋体"/>
-        <a:font script="Hant" typeface="新細明體"/>
-        <a:font script="Arab" typeface="Times New Roman"/>
-        <a:font script="Hebr" typeface="Times New Roman"/>
-        <a:font script="Thai" typeface="Angsana New"/>
-        <a:font script="Ethi" typeface="Nyala"/>
-        <a:font script="Beng" typeface="Vrinda"/>
-        <a:font script="Gujr" typeface="Shruti"/>
-        <a:font script="Khmr" typeface="MoolBoran"/>
-        <a:font script="Knda" typeface="Tunga"/>
-        <a:font script="Guru" typeface="Raavi"/>
-        <a:font script="Cans" typeface="Euphemia"/>
-        <a:font script="Cher" typeface="Plantagenet Cherokee"/>
-        <a:font script="Yiii" typeface="Microsoft Yi Baiti"/>
-        <a:font script="Tibt" typeface="Microsoft Himalaya"/>
-        <a:font script="Thaa" typeface="MV Boli"/>
-        <a:font script="Deva" typeface="Mangal"/>
-        <a:font script="Telu" typeface="Gautami"/>
-        <a:font script="Taml" typeface="Latha"/>
-        <a:font script="Syrc" typeface="Estrangelo Edessa"/>
-        <a:font script="Orya" typeface="Kalinga"/>
-        <a:font script="Mlym" typeface="Kartika"/>
-        <a:font script="Laoo" typeface="DokChampa"/>
-        <a:font script="Sinh" typeface="Iskoola Pota"/>
-        <a:font script="Mong" typeface="Mongolian Baiti"/>
-        <a:font script="Viet" typeface="Times New Roman"/>
-        <a:font script="Uigh" typeface="Microsoft Uighur"/>
-        <a:font script="Geor" typeface="Sylfaen"/>
-      </a:majorFont>
-      <a:minorFont>
-        <a:latin typeface="Arial"/>
-        <a:ea typeface=""/>
-        <a:cs typeface=""/>
-        <a:font script="Jpan" typeface="ＭＳ Ｐゴシック"/>
-        <a:font script="Hang" typeface="맑은 고딕"/>
-        <a:font script="Hans" typeface="宋体"/>
-        <a:font script="Hant" typeface="新細明體"/>
-        <a:font script="Arab" typeface="Arial"/>
-        <a:font script="Hebr" typeface="Arial"/>
-        <a:font script="Thai" typeface="Cordia New"/>
-        <a:font script="Ethi" typeface="Nyala"/>
-        <a:font script="Beng" typeface="Vrinda"/>
-        <a:font script="Gujr" typeface="Shruti"/>
-        <a:font script="Khmr" typeface="DaunPenh"/>
-        <a:font script="Knda" typeface="Tunga"/>
-        <a:font script="Guru" typeface="Raavi"/>
-        <a:font script="Cans" typeface="Euphemia"/>
-        <a:font script="Cher" typeface="Plantagenet Cherokee"/>
-        <a:font script="Yiii" typeface="Microsoft Yi Baiti"/>
-        <a:font script="Tibt" typeface="Microsoft Himalaya"/>
-        <a:font script="Thaa" typeface="MV Boli"/>
-        <a:font script="Deva" typeface="Mangal"/>
-        <a:font script="Telu" typeface="Gautami"/>
-        <a:font script="Taml" typeface="Latha"/>
-        <a:font script="Syrc" typeface="Estrangelo Edessa"/>
-        <a:font script="Orya" typeface="Kalinga"/>
-        <a:font script="Mlym" typeface="Kartika"/>
-        <a:font script="Laoo" typeface="DokChampa"/>
-        <a:font script="Sinh" typeface="Iskoola Pota"/>
-        <a:font script="Mong" typeface="Mongolian Baiti"/>
-        <a:font script="Viet" typeface="Arial"/>
-        <a:font script="Uigh" typeface="Microsoft Uighur"/>
-        <a:font script="Geor" typeface="Sylfaen"/>
-      </a:minorFont>
-    </a:fontScheme>
-    <a:fmtScheme name="Office">
-      <a:fillStyleLst>
-        <a:solidFill>
-          <a:schemeClr val="phClr"/>
-        </a:solidFill>
-        <a:gradFill rotWithShape="1">
-          <a:gsLst>
-            <a:gs pos="0">
-              <a:schemeClr val="phClr">
-                <a:tint val="50000"/>
-                <a:satMod val="300000"/>
-              </a:schemeClr>
-            </a:gs>
-            <a:gs pos="35000">
-              <a:schemeClr val="phClr">
-                <a:tint val="37000"/>
-                <a:satMod val="300000"/>
-              </a:schemeClr>
-            </a:gs>
-            <a:gs pos="100000">
-              <a:schemeClr val="phClr">
-                <a:tint val="15000"/>
-                <a:satMod val="350000"/>
-              </a:schemeClr>
-            </a:gs>
-          </a:gsLst>
-          <a:lin ang="16200000" scaled="1"/>
-        </a:gradFill>
-        <a:gradFill rotWithShape="1">
-          <a:gsLst>
-            <a:gs pos="0">
-              <a:schemeClr val="phClr">
-                <a:tint val="100000"/>
-                <a:shade val="100000"/>
-                <a:satMod val="130000"/>
-              </a:schemeClr>
-            </a:gs>
-            <a:gs pos="100000">
-              <a:schemeClr val="phClr">
-                <a:tint val="50000"/>
-                <a:shade val="100000"/>
-                <a:satMod val="350000"/>
-              </a:schemeClr>
-            </a:gs>
-          </a:gsLst>
-          <a:lin ang="16200000" scaled="0"/>
-        </a:gradFill>
-      </a:fillStyleLst>
-      <a:lnStyleLst>
-        <a:ln w="9525" cap="flat" cmpd="sng" algn="ctr">
-          <a:solidFill>
-            <a:schemeClr val="phClr">
-              <a:shade val="95000"/>
-              <a:satMod val="105000"/>
-            </a:schemeClr>
-          </a:solidFill>
-          <a:prstDash val="solid"/>
-        </a:ln>
-        <a:ln w="25400" cap="flat" cmpd="sng" algn="ctr">
-          <a:solidFill>
-            <a:schemeClr val="phClr"/>
-          </a:solidFill>
-          <a:prstDash val="solid"/>
-        </a:ln>
-        <a:ln w="38100" cap="flat" cmpd="sng" algn="ctr">
-          <a:solidFill>
-            <a:schemeClr val="phClr"/>
-          </a:solidFill>
-          <a:prstDash val="solid"/>
-        </a:ln>
-      </a:lnStyleLst>
-      <a:effectStyleLst>
-        <a:effectStyle>
-          <a:effectLst>
-            <a:outerShdw blurRad="40000" dist="20000" dir="5400000" rotWithShape="0">
-              <a:srgbClr val="000000">
-                <a:alpha val="38000"/>
-              </a:srgbClr>
-            </a:outerShdw>
-          </a:effectLst>
-        </a:effectStyle>
-        <a:effectStyle>
-          <a:effectLst>
-            <a:outerShdw blurRad="40000" dist="23000" dir="5400000" rotWithShape="0">
-              <a:srgbClr val="000000">
-                <a:alpha val="35000"/>
-              </a:srgbClr>
-            </a:outerShdw>
-          </a:effectLst>
-        </a:effectStyle>
-        <a:effectStyle>
-          <a:effectLst>
-            <a:outerShdw blurRad="40000" dist="23000" dir="5400000" rotWithShape="0">
-              <a:srgbClr val="000000">
-                <a:alpha val="35000"/>
-              </a:srgbClr>
-            </a:outerShdw>
-          </a:effectLst>
-          <a:scene3d>
-            <a:camera prst="orthographicFront">
-              <a:rot lat="0" lon="0" rev="0"/>
-            </a:camera>
-            <a:lightRig rig="threePt" dir="t">
-              <a:rot lat="0" lon="0" rev="1200000"/>
-            </a:lightRig>
-          </a:scene3d>
-          <a:sp3d>
-            <a:bevelT w="63500" h="25400"/>
-          </a:sp3d>
-        </a:effectStyle>
-      </a:effectStyleLst>
-      <a:bgFillStyleLst>
-        <a:solidFill>
-          <a:schemeClr val="phClr"/>
-        </a:solidFill>
-        <a:gradFill rotWithShape="1">
-          <a:gsLst>
-            <a:gs pos="0">
-              <a:schemeClr val="phClr">
-                <a:tint val="40000"/>
-                <a:satMod val="350000"/>
-              </a:schemeClr>
-            </a:gs>
-            <a:gs pos="40000">
-              <a:schemeClr val="phClr">
-                <a:tint val="45000"/>
-                <a:shade val="99000"/>
-                <a:satMod val="350000"/>
-              </a:schemeClr>
-            </a:gs>
-            <a:gs pos="100000">
-              <a:schemeClr val="phClr">
-                <a:shade val="20000"/>
-                <a:satMod val="255000"/>
-              </a:schemeClr>
-            </a:gs>
-          </a:gsLst>
-          <a:path path="circle">
-            <a:fillToRect l="50000" t="-80000" r="50000" b="180000"/>
-          </a:path>
-        </a:gradFill>
-        <a:gradFill rotWithShape="1">
-          <a:gsLst>
-            <a:gs pos="0">
-              <a:schemeClr val="phClr">
-                <a:tint val="80000"/>
-                <a:satMod val="300000"/>
-              </a:schemeClr>
-            </a:gs>
-            <a:gs pos="100000">
-              <a:schemeClr val="phClr">
-                <a:shade val="30000"/>
-                <a:satMod val="200000"/>
-              </a:schemeClr>
-            </a:gs>
-          </a:gsLst>
-          <a:path path="circle">
-            <a:fillToRect l="50000" t="50000" r="50000" b="50000"/>
-          </a:path>
-        </a:gradFill>
-      </a:bgFillStyleLst>
-    </a:fmtScheme>
-  </a:themeElements>
-</a:theme>
 </file>
</xml_diff>